<commit_message>
20200309{Add Week 4 resources _1}
</commit_message>
<xml_diff>
--- a/GIS{Dr_Ahmed_AbuEl-ftouh,Dr_Nabila_Hamed}/Lectures/Lecture 2.pptx
+++ b/GIS{Dr_Ahmed_AbuEl-ftouh,Dr_Nabila_Hamed}/Lectures/Lecture 2.pptx
@@ -125,6 +125,11 @@
       </a:defRPr>
     </a:lvl9pPr>
   </p:defaultTextStyle>
+  <p:extLst>
+    <p:ext uri="{EFAFB233-063F-42B5-8137-9DF3F51BA10A}">
+      <p15:sldGuideLst xmlns:p15="http://schemas.microsoft.com/office/powerpoint/2012/main"/>
+    </p:ext>
+  </p:extLst>
 </p:presentation>
 </file>
 
@@ -210,7 +215,7 @@
           <a:p>
             <a:fld id="{ECB002C7-60F8-484E-9D48-5F3A07F335AD}" type="datetimeFigureOut">
               <a:rPr lang="en-US" smtClean="0"/>
-              <a:t>2/16/2020</a:t>
+              <a:t>3/7/2020</a:t>
             </a:fld>
             <a:endParaRPr lang="en-US"/>
           </a:p>
@@ -666,7 +671,7 @@
             </a:extLst>
           </p:cNvPr>
           <p:cNvSpPr>
-            <a:spLocks noRot="1" noChangeArrowheads="1" noTextEdit="1"/>
+            <a:spLocks noGrp="1" noRot="1" noChangeAspect="1" noChangeArrowheads="1" noTextEdit="1"/>
           </p:cNvSpPr>
           <p:nvPr>
             <p:ph type="sldImg"/>
@@ -960,7 +965,7 @@
             </a:extLst>
           </p:cNvPr>
           <p:cNvSpPr>
-            <a:spLocks noRot="1" noChangeArrowheads="1" noTextEdit="1"/>
+            <a:spLocks noGrp="1" noRot="1" noChangeAspect="1" noChangeArrowheads="1" noTextEdit="1"/>
           </p:cNvSpPr>
           <p:nvPr>
             <p:ph type="sldImg"/>
@@ -1224,7 +1229,7 @@
             </a:extLst>
           </p:cNvPr>
           <p:cNvSpPr>
-            <a:spLocks noRot="1" noChangeArrowheads="1" noTextEdit="1"/>
+            <a:spLocks noGrp="1" noRot="1" noChangeAspect="1" noChangeArrowheads="1" noTextEdit="1"/>
           </p:cNvSpPr>
           <p:nvPr>
             <p:ph type="sldImg"/>
@@ -2189,7 +2194,7 @@
           <a:p>
             <a:fld id="{BCFFF6C3-F06C-4A79-9F7B-CA769255ACCE}" type="datetimeFigureOut">
               <a:rPr lang="en-US" smtClean="0"/>
-              <a:t>2/15/2020</a:t>
+              <a:t>3/7/2020</a:t>
             </a:fld>
             <a:endParaRPr lang="en-US"/>
           </a:p>
@@ -2440,7 +2445,7 @@
           <a:p>
             <a:fld id="{BCFFF6C3-F06C-4A79-9F7B-CA769255ACCE}" type="datetimeFigureOut">
               <a:rPr lang="en-US" smtClean="0"/>
-              <a:t>2/15/2020</a:t>
+              <a:t>3/7/2020</a:t>
             </a:fld>
             <a:endParaRPr lang="en-US"/>
           </a:p>
@@ -2754,7 +2759,7 @@
           <a:p>
             <a:fld id="{BCFFF6C3-F06C-4A79-9F7B-CA769255ACCE}" type="datetimeFigureOut">
               <a:rPr lang="en-US" smtClean="0"/>
-              <a:t>2/15/2020</a:t>
+              <a:t>3/7/2020</a:t>
             </a:fld>
             <a:endParaRPr lang="en-US"/>
           </a:p>
@@ -3095,7 +3100,7 @@
           <a:p>
             <a:fld id="{BCFFF6C3-F06C-4A79-9F7B-CA769255ACCE}" type="datetimeFigureOut">
               <a:rPr lang="en-US" smtClean="0"/>
-              <a:t>2/15/2020</a:t>
+              <a:t>3/7/2020</a:t>
             </a:fld>
             <a:endParaRPr lang="en-US"/>
           </a:p>
@@ -3409,7 +3414,7 @@
           <a:p>
             <a:fld id="{BCFFF6C3-F06C-4A79-9F7B-CA769255ACCE}" type="datetimeFigureOut">
               <a:rPr lang="en-US" smtClean="0"/>
-              <a:t>2/15/2020</a:t>
+              <a:t>3/7/2020</a:t>
             </a:fld>
             <a:endParaRPr lang="en-US"/>
           </a:p>
@@ -3802,7 +3807,7 @@
           <a:p>
             <a:fld id="{BCFFF6C3-F06C-4A79-9F7B-CA769255ACCE}" type="datetimeFigureOut">
               <a:rPr lang="en-US" smtClean="0"/>
-              <a:t>2/15/2020</a:t>
+              <a:t>3/7/2020</a:t>
             </a:fld>
             <a:endParaRPr lang="en-US"/>
           </a:p>
@@ -3972,7 +3977,7 @@
           <a:p>
             <a:fld id="{BCFFF6C3-F06C-4A79-9F7B-CA769255ACCE}" type="datetimeFigureOut">
               <a:rPr lang="en-US" smtClean="0"/>
-              <a:t>2/15/2020</a:t>
+              <a:t>3/7/2020</a:t>
             </a:fld>
             <a:endParaRPr lang="en-US"/>
           </a:p>
@@ -4152,7 +4157,7 @@
           <a:p>
             <a:fld id="{BCFFF6C3-F06C-4A79-9F7B-CA769255ACCE}" type="datetimeFigureOut">
               <a:rPr lang="en-US" smtClean="0"/>
-              <a:t>2/15/2020</a:t>
+              <a:t>3/7/2020</a:t>
             </a:fld>
             <a:endParaRPr lang="en-US"/>
           </a:p>
@@ -4328,7 +4333,7 @@
           <a:p>
             <a:fld id="{BCFFF6C3-F06C-4A79-9F7B-CA769255ACCE}" type="datetimeFigureOut">
               <a:rPr lang="en-US" smtClean="0"/>
-              <a:t>2/15/2020</a:t>
+              <a:t>3/7/2020</a:t>
             </a:fld>
             <a:endParaRPr lang="en-US"/>
           </a:p>
@@ -4575,7 +4580,7 @@
           <a:p>
             <a:fld id="{BCFFF6C3-F06C-4A79-9F7B-CA769255ACCE}" type="datetimeFigureOut">
               <a:rPr lang="en-US" smtClean="0"/>
-              <a:t>2/15/2020</a:t>
+              <a:t>3/7/2020</a:t>
             </a:fld>
             <a:endParaRPr lang="en-US"/>
           </a:p>
@@ -4807,7 +4812,7 @@
           <a:p>
             <a:fld id="{BCFFF6C3-F06C-4A79-9F7B-CA769255ACCE}" type="datetimeFigureOut">
               <a:rPr lang="en-US" smtClean="0"/>
-              <a:t>2/15/2020</a:t>
+              <a:t>3/7/2020</a:t>
             </a:fld>
             <a:endParaRPr lang="en-US"/>
           </a:p>
@@ -5181,7 +5186,7 @@
           <a:p>
             <a:fld id="{BCFFF6C3-F06C-4A79-9F7B-CA769255ACCE}" type="datetimeFigureOut">
               <a:rPr lang="en-US" smtClean="0"/>
-              <a:t>2/15/2020</a:t>
+              <a:t>3/7/2020</a:t>
             </a:fld>
             <a:endParaRPr lang="en-US"/>
           </a:p>
@@ -5304,7 +5309,7 @@
           <a:p>
             <a:fld id="{BCFFF6C3-F06C-4A79-9F7B-CA769255ACCE}" type="datetimeFigureOut">
               <a:rPr lang="en-US" smtClean="0"/>
-              <a:t>2/15/2020</a:t>
+              <a:t>3/7/2020</a:t>
             </a:fld>
             <a:endParaRPr lang="en-US"/>
           </a:p>
@@ -5399,7 +5404,7 @@
           <a:p>
             <a:fld id="{BCFFF6C3-F06C-4A79-9F7B-CA769255ACCE}" type="datetimeFigureOut">
               <a:rPr lang="en-US" smtClean="0"/>
-              <a:t>2/15/2020</a:t>
+              <a:t>3/7/2020</a:t>
             </a:fld>
             <a:endParaRPr lang="en-US"/>
           </a:p>
@@ -5654,7 +5659,7 @@
           <a:p>
             <a:fld id="{BCFFF6C3-F06C-4A79-9F7B-CA769255ACCE}" type="datetimeFigureOut">
               <a:rPr lang="en-US" smtClean="0"/>
-              <a:t>2/15/2020</a:t>
+              <a:t>3/7/2020</a:t>
             </a:fld>
             <a:endParaRPr lang="en-US"/>
           </a:p>
@@ -5917,7 +5922,7 @@
           <a:p>
             <a:fld id="{BCFFF6C3-F06C-4A79-9F7B-CA769255ACCE}" type="datetimeFigureOut">
               <a:rPr lang="en-US" smtClean="0"/>
-              <a:t>2/15/2020</a:t>
+              <a:t>3/7/2020</a:t>
             </a:fld>
             <a:endParaRPr lang="en-US"/>
           </a:p>
@@ -6660,7 +6665,7 @@
           <a:p>
             <a:fld id="{BCFFF6C3-F06C-4A79-9F7B-CA769255ACCE}" type="datetimeFigureOut">
               <a:rPr lang="en-US" smtClean="0"/>
-              <a:t>2/15/2020</a:t>
+              <a:t>3/7/2020</a:t>
             </a:fld>
             <a:endParaRPr lang="en-US"/>
           </a:p>
@@ -7942,10 +7947,10 @@
         </p:nvGrpSpPr>
         <p:grpSpPr bwMode="auto">
           <a:xfrm>
-            <a:off x="1538288" y="2133601"/>
-            <a:ext cx="7848600" cy="4087813"/>
-            <a:chOff x="432" y="1344"/>
-            <a:chExt cx="4944" cy="2575"/>
+            <a:off x="1487488" y="2115217"/>
+            <a:ext cx="7848600" cy="4076700"/>
+            <a:chOff x="432" y="1351"/>
+            <a:chExt cx="4944" cy="2568"/>
           </a:xfrm>
         </p:grpSpPr>
         <p:sp>
@@ -8189,10 +8194,10 @@
           </p:nvGrpSpPr>
           <p:grpSpPr bwMode="auto">
             <a:xfrm>
-              <a:off x="432" y="2832"/>
-              <a:ext cx="2429" cy="1087"/>
-              <a:chOff x="432" y="2832"/>
-              <a:chExt cx="2429" cy="1087"/>
+              <a:off x="432" y="2833"/>
+              <a:ext cx="2455" cy="1086"/>
+              <a:chOff x="432" y="2833"/>
+              <a:chExt cx="2455" cy="1086"/>
             </a:xfrm>
           </p:grpSpPr>
           <p:sp>
@@ -8847,10 +8852,10 @@
             </p:nvGrpSpPr>
             <p:grpSpPr bwMode="auto">
               <a:xfrm>
-                <a:off x="871" y="2832"/>
-                <a:ext cx="1990" cy="900"/>
-                <a:chOff x="984" y="2804"/>
-                <a:chExt cx="1990" cy="900"/>
+                <a:off x="871" y="2833"/>
+                <a:ext cx="2016" cy="899"/>
+                <a:chOff x="984" y="2805"/>
+                <a:chExt cx="2016" cy="899"/>
               </a:xfrm>
             </p:grpSpPr>
             <p:pic>
@@ -8882,7 +8887,7 @@
               </p:blipFill>
               <p:spPr bwMode="gray">
                 <a:xfrm>
-                  <a:off x="1024" y="2804"/>
+                  <a:off x="1050" y="2805"/>
                   <a:ext cx="1950" cy="858"/>
                 </a:xfrm>
                 <a:prstGeom prst="rect">
@@ -9122,10 +9127,10 @@
           </p:nvGrpSpPr>
           <p:grpSpPr bwMode="auto">
             <a:xfrm>
-              <a:off x="712" y="1344"/>
-              <a:ext cx="2350" cy="864"/>
-              <a:chOff x="744" y="1344"/>
-              <a:chExt cx="2350" cy="864"/>
+              <a:off x="734" y="1351"/>
+              <a:ext cx="2328" cy="864"/>
+              <a:chOff x="766" y="1351"/>
+              <a:chExt cx="2328" cy="864"/>
             </a:xfrm>
           </p:grpSpPr>
           <p:sp>
@@ -9144,7 +9149,7 @@
             </p:nvSpPr>
             <p:spPr bwMode="gray">
               <a:xfrm>
-                <a:off x="744" y="1344"/>
+                <a:off x="766" y="1351"/>
                 <a:ext cx="2328" cy="864"/>
               </a:xfrm>
               <a:prstGeom prst="rect">
@@ -11351,7 +11356,7 @@
               </a:spcAft>
             </a:pPr>
             <a:r>
-              <a:rPr lang="en-US" altLang="en-US"/>
+              <a:rPr lang="en-US" altLang="en-US" dirty="0"/>
               <a:t>Real-world entities are abstracted into three basic shapes</a:t>
             </a:r>
           </a:p>
@@ -11361,7 +11366,7 @@
                 <a:spcPts val="100"/>
               </a:spcAft>
             </a:pPr>
-            <a:endParaRPr lang="en-US" altLang="en-US"/>
+            <a:endParaRPr lang="en-US" altLang="en-US" dirty="0"/>
           </a:p>
         </p:txBody>
       </p:sp>
@@ -13220,7 +13225,7 @@
           <a:p>
             <a:pPr eaLnBrk="1" hangingPunct="1"/>
             <a:r>
-              <a:rPr lang="en-US" altLang="en-US"/>
+              <a:rPr lang="en-US" altLang="en-US" dirty="0"/>
               <a:t>Raster data Format</a:t>
             </a:r>
           </a:p>
@@ -13285,34 +13290,34 @@
           <a:lstStyle/>
           <a:p>
             <a:r>
-              <a:rPr lang="en-US"/>
+              <a:rPr lang="en-US" dirty="0"/>
               <a:t>Areas broken into ‘pixels’ or cells Each cell contains data</a:t>
             </a:r>
           </a:p>
           <a:p>
             <a:r>
-              <a:rPr lang="en-US"/>
+              <a:rPr lang="en-US" dirty="0"/>
               <a:t>Good at representing</a:t>
             </a:r>
           </a:p>
           <a:p>
             <a:pPr lvl="1"/>
             <a:r>
-              <a:rPr lang="en-US"/>
+              <a:rPr lang="en-US" dirty="0"/>
               <a:t>dense data</a:t>
             </a:r>
           </a:p>
           <a:p>
             <a:pPr lvl="1"/>
             <a:r>
-              <a:rPr lang="en-US"/>
+              <a:rPr lang="en-US" dirty="0"/>
               <a:t>land cover</a:t>
             </a:r>
           </a:p>
           <a:p>
             <a:pPr lvl="1"/>
             <a:r>
-              <a:rPr lang="en-US"/>
+              <a:rPr lang="en-US" dirty="0"/>
               <a:t>Elevation</a:t>
             </a:r>
           </a:p>
@@ -13320,7 +13325,7 @@
             <a:pPr marL="0" indent="0">
               <a:buNone/>
             </a:pPr>
-            <a:endParaRPr lang="en-US" altLang="en-US"/>
+            <a:endParaRPr lang="en-US" altLang="en-US" dirty="0"/>
           </a:p>
         </p:txBody>
       </p:sp>
@@ -13376,10 +13381,9 @@
           <a:lstStyle/>
           <a:p>
             <a:r>
-              <a:rPr lang="en-US"/>
+              <a:rPr lang="en-US" dirty="0"/>
               <a:t>Vector versus Raster presentation</a:t>
             </a:r>
-            <a:endParaRPr lang="en-US" dirty="0"/>
           </a:p>
         </p:txBody>
       </p:sp>

</xml_diff>